<commit_message>
VPC update - clarify connectivity options
</commit_message>
<xml_diff>
--- a/aws-vpc/aws-vpc.pptx
+++ b/aws-vpc/aws-vpc.pptx
@@ -240,7 +240,7 @@
           <a:p>
             <a:fld id="{1B6676A5-1300-B945-98B1-DD92DDC3A3CB}" type="datetimeFigureOut">
               <a:rPr lang="en-US" smtClean="0"/>
-              <a:t>12/1/15</a:t>
+              <a:t>12/2/15</a:t>
             </a:fld>
             <a:endParaRPr lang="en-US"/>
           </a:p>
@@ -732,7 +732,15 @@
             </a:pPr>
             <a:r>
               <a:rPr lang="en-US" dirty="0" smtClean="0"/>
-              <a:t>I’d prefer to isolate resources based</a:t>
+              <a:t>I’d prefer to </a:t>
+            </a:r>
+            <a:r>
+              <a:rPr lang="en-US" dirty="0" smtClean="0"/>
+              <a:t>isolate management of </a:t>
+            </a:r>
+            <a:r>
+              <a:rPr lang="en-US" dirty="0" smtClean="0"/>
+              <a:t>resources based</a:t>
             </a:r>
             <a:r>
               <a:rPr lang="en-US" baseline="0" dirty="0" smtClean="0"/>
@@ -2691,6 +2699,24 @@
           <a:bodyPr/>
           <a:lstStyle/>
           <a:p>
+            <a:r>
+              <a:rPr lang="en-US" dirty="0" smtClean="0"/>
+              <a:t>Presenter’s Note:</a:t>
+            </a:r>
+          </a:p>
+          <a:p>
+            <a:pPr marL="171450" indent="-171450">
+              <a:buFont typeface="Arial" charset="0"/>
+              <a:buChar char="•"/>
+            </a:pPr>
+            <a:r>
+              <a:rPr lang="en-US" dirty="0" err="1" smtClean="0"/>
+              <a:t>ssh</a:t>
+            </a:r>
+            <a:r>
+              <a:rPr lang="en-US" dirty="0" smtClean="0"/>
+              <a:t> Host does not necessarily need to be in Public Subnet</a:t>
+            </a:r>
             <a:endParaRPr lang="en-US" dirty="0" smtClean="0"/>
           </a:p>
         </p:txBody>
@@ -3227,7 +3253,79 @@
           <a:bodyPr/>
           <a:lstStyle/>
           <a:p>
+            <a:pPr marL="171450" marR="0" indent="-171450" algn="l" defTabSz="457200" rtl="0" eaLnBrk="1" fontAlgn="auto" latinLnBrk="0" hangingPunct="1">
+              <a:lnSpc>
+                <a:spcPct val="100000"/>
+              </a:lnSpc>
+              <a:spcBef>
+                <a:spcPts val="0"/>
+              </a:spcBef>
+              <a:spcAft>
+                <a:spcPts val="0"/>
+              </a:spcAft>
+              <a:buClrTx/>
+              <a:buSzTx/>
+              <a:buFont typeface="Arial" charset="0"/>
+              <a:buChar char="•"/>
+              <a:tabLst/>
+              <a:defRPr/>
+            </a:pPr>
+            <a:r>
+              <a:rPr lang="en-US" dirty="0" smtClean="0"/>
+              <a:t>Company with non-technical users of AWS resources: VPN</a:t>
+            </a:r>
+          </a:p>
+          <a:p>
+            <a:pPr marL="628650" marR="0" lvl="1" indent="-171450" algn="l" defTabSz="457200" rtl="0" eaLnBrk="1" fontAlgn="auto" latinLnBrk="0" hangingPunct="1">
+              <a:lnSpc>
+                <a:spcPct val="100000"/>
+              </a:lnSpc>
+              <a:spcBef>
+                <a:spcPts val="0"/>
+              </a:spcBef>
+              <a:spcAft>
+                <a:spcPts val="0"/>
+              </a:spcAft>
+              <a:buClrTx/>
+              <a:buSzTx/>
+              <a:buFont typeface="Arial" charset="0"/>
+              <a:buChar char="•"/>
+              <a:tabLst/>
+              <a:defRPr/>
+            </a:pPr>
+            <a:r>
+              <a:rPr lang="en-US" dirty="0" err="1" smtClean="0"/>
+              <a:t>ssh</a:t>
+            </a:r>
+            <a:r>
+              <a:rPr lang="en-US" dirty="0" smtClean="0"/>
+              <a:t> tricks such as SOCKS proxy can</a:t>
+            </a:r>
+            <a:r>
+              <a:rPr lang="en-US" baseline="0" dirty="0" smtClean="0"/>
+              <a:t> be tricky for non-technical users</a:t>
+            </a:r>
             <a:endParaRPr lang="en-US" dirty="0" smtClean="0"/>
+          </a:p>
+          <a:p>
+            <a:pPr marL="171450" marR="0" indent="-171450" algn="l" defTabSz="457200" rtl="0" eaLnBrk="1" fontAlgn="auto" latinLnBrk="0" hangingPunct="1">
+              <a:lnSpc>
+                <a:spcPct val="100000"/>
+              </a:lnSpc>
+              <a:spcBef>
+                <a:spcPts val="0"/>
+              </a:spcBef>
+              <a:spcAft>
+                <a:spcPts val="0"/>
+              </a:spcAft>
+              <a:buClrTx/>
+              <a:buSzTx/>
+              <a:buFont typeface="Arial" charset="0"/>
+              <a:buChar char="•"/>
+              <a:tabLst/>
+              <a:defRPr/>
+            </a:pPr>
+            <a:endParaRPr lang="en-US" baseline="0" dirty="0" smtClean="0"/>
           </a:p>
         </p:txBody>
       </p:sp>
@@ -5793,7 +5891,7 @@
           <a:p>
             <a:fld id="{7CE38E4D-051A-41E1-86A4-E56916468FD0}" type="datetimeFigureOut">
               <a:rPr lang="en-US" smtClean="0"/>
-              <a:t>12/1/15</a:t>
+              <a:t>12/2/15</a:t>
             </a:fld>
             <a:endParaRPr lang="en-US"/>
           </a:p>
@@ -5974,7 +6072,7 @@
           <a:p>
             <a:fld id="{7CE38E4D-051A-41E1-86A4-E56916468FD0}" type="datetimeFigureOut">
               <a:rPr lang="en-US" smtClean="0"/>
-              <a:t>12/1/15</a:t>
+              <a:t>12/2/15</a:t>
             </a:fld>
             <a:endParaRPr lang="en-US"/>
           </a:p>
@@ -6125,7 +6223,7 @@
           <a:p>
             <a:fld id="{7CE38E4D-051A-41E1-86A4-E56916468FD0}" type="datetimeFigureOut">
               <a:rPr lang="en-US" smtClean="0"/>
-              <a:t>12/1/15</a:t>
+              <a:t>12/2/15</a:t>
             </a:fld>
             <a:endParaRPr lang="en-US"/>
           </a:p>
@@ -7951,7 +8049,7 @@
           <a:p>
             <a:fld id="{7CE38E4D-051A-41E1-86A4-E56916468FD0}" type="datetimeFigureOut">
               <a:rPr lang="en-US" smtClean="0"/>
-              <a:t>12/1/15</a:t>
+              <a:t>12/2/15</a:t>
             </a:fld>
             <a:endParaRPr lang="en-US"/>
           </a:p>
@@ -9821,7 +9919,7 @@
           <a:p>
             <a:fld id="{7CE38E4D-051A-41E1-86A4-E56916468FD0}" type="datetimeFigureOut">
               <a:rPr lang="en-US" smtClean="0"/>
-              <a:t>12/1/15</a:t>
+              <a:t>12/2/15</a:t>
             </a:fld>
             <a:endParaRPr lang="en-US"/>
           </a:p>
@@ -9934,7 +10032,7 @@
           <a:p>
             <a:fld id="{7CE38E4D-051A-41E1-86A4-E56916468FD0}" type="datetimeFigureOut">
               <a:rPr lang="en-US" smtClean="0"/>
-              <a:t>12/1/15</a:t>
+              <a:t>12/2/15</a:t>
             </a:fld>
             <a:endParaRPr lang="en-US"/>
           </a:p>
@@ -10475,7 +10573,7 @@
           <a:p>
             <a:fld id="{7CE38E4D-051A-41E1-86A4-E56916468FD0}" type="datetimeFigureOut">
               <a:rPr lang="en-US" smtClean="0"/>
-              <a:t>12/1/15</a:t>
+              <a:t>12/2/15</a:t>
             </a:fld>
             <a:endParaRPr lang="en-US"/>
           </a:p>
@@ -10588,7 +10686,7 @@
           <a:p>
             <a:fld id="{7CE38E4D-051A-41E1-86A4-E56916468FD0}" type="datetimeFigureOut">
               <a:rPr lang="en-US" smtClean="0"/>
-              <a:t>12/1/15</a:t>
+              <a:t>12/2/15</a:t>
             </a:fld>
             <a:endParaRPr lang="en-US"/>
           </a:p>
@@ -12299,7 +12397,7 @@
           <a:p>
             <a:fld id="{7CE38E4D-051A-41E1-86A4-E56916468FD0}" type="datetimeFigureOut">
               <a:rPr lang="en-US" smtClean="0"/>
-              <a:t>12/1/15</a:t>
+              <a:t>12/2/15</a:t>
             </a:fld>
             <a:endParaRPr lang="en-US"/>
           </a:p>
@@ -12450,7 +12548,7 @@
           <a:p>
             <a:fld id="{7CE38E4D-051A-41E1-86A4-E56916468FD0}" type="datetimeFigureOut">
               <a:rPr lang="en-US" smtClean="0"/>
-              <a:t>12/1/15</a:t>
+              <a:t>12/2/15</a:t>
             </a:fld>
             <a:endParaRPr lang="en-US"/>
           </a:p>
@@ -16065,7 +16163,7 @@
           <a:p>
             <a:fld id="{7CE38E4D-051A-41E1-86A4-E56916468FD0}" type="datetimeFigureOut">
               <a:rPr lang="en-US" smtClean="0"/>
-              <a:t>12/1/15</a:t>
+              <a:t>12/2/15</a:t>
             </a:fld>
             <a:endParaRPr lang="en-US"/>
           </a:p>
@@ -17924,7 +18022,7 @@
           <a:p>
             <a:fld id="{7CE38E4D-051A-41E1-86A4-E56916468FD0}" type="datetimeFigureOut">
               <a:rPr lang="en-US" smtClean="0"/>
-              <a:t>12/1/15</a:t>
+              <a:t>12/2/15</a:t>
             </a:fld>
             <a:endParaRPr lang="en-US"/>
           </a:p>
@@ -18554,7 +18652,7 @@
         <p:spPr/>
         <p:txBody>
           <a:bodyPr>
-            <a:normAutofit/>
+            <a:normAutofit lnSpcReduction="10000"/>
           </a:bodyPr>
           <a:lstStyle/>
           <a:p>
@@ -18574,8 +18672,20 @@
             <a:pPr lvl="1"/>
             <a:r>
               <a:rPr lang="en-US" dirty="0" smtClean="0"/>
-              <a:t>Hosts using Internet Gateway must still have Public IP Address</a:t>
-            </a:r>
+              <a:t>Hosts using Internet Gateway must still have Public IP </a:t>
+            </a:r>
+            <a:r>
+              <a:rPr lang="en-US" dirty="0" smtClean="0"/>
+              <a:t>Address</a:t>
+            </a:r>
+          </a:p>
+          <a:p>
+            <a:pPr lvl="1"/>
+            <a:r>
+              <a:rPr lang="en-US" dirty="0" smtClean="0"/>
+              <a:t>Use with NAT EC2 instance to allow servers with private IP addresses access to Public Internet</a:t>
+            </a:r>
+            <a:endParaRPr lang="en-US" dirty="0" smtClean="0"/>
           </a:p>
           <a:p>
             <a:r>
@@ -18594,7 +18704,15 @@
             <a:pPr lvl="1"/>
             <a:r>
               <a:rPr lang="en-US" dirty="0" smtClean="0"/>
-              <a:t>Inbound and Outbound Rules</a:t>
+              <a:t>Inbound </a:t>
+            </a:r>
+            <a:r>
+              <a:rPr lang="en-US" i="1" dirty="0" smtClean="0"/>
+              <a:t>and</a:t>
+            </a:r>
+            <a:r>
+              <a:rPr lang="en-US" dirty="0" smtClean="0"/>
+              <a:t> Outbound Rules</a:t>
             </a:r>
           </a:p>
           <a:p>
@@ -18690,16 +18808,11 @@
               <a:rPr lang="en-US" dirty="0" smtClean="0"/>
               <a:t>Examples:</a:t>
             </a:r>
-            <a:endParaRPr lang="en-US" dirty="0" smtClean="0"/>
-          </a:p>
-          <a:p>
-            <a:r>
-              <a:rPr lang="en-US" dirty="0" smtClean="0"/>
-              <a:t>1 </a:t>
-            </a:r>
-            <a:r>
-              <a:rPr lang="en-US" dirty="0" smtClean="0"/>
-              <a:t>VPC</a:t>
+          </a:p>
+          <a:p>
+            <a:r>
+              <a:rPr lang="en-US" dirty="0" smtClean="0"/>
+              <a:t>1 VPC</a:t>
             </a:r>
           </a:p>
           <a:p>
@@ -18717,17 +18830,17 @@
           <a:p>
             <a:r>
               <a:rPr lang="en-US" dirty="0" smtClean="0"/>
-              <a:t>1 VPC per Environment per </a:t>
-            </a:r>
-            <a:r>
-              <a:rPr lang="en-US" dirty="0" smtClean="0"/>
-              <a:t>Application</a:t>
-            </a:r>
-          </a:p>
-          <a:p>
-            <a:r>
-              <a:rPr lang="en-US" dirty="0" smtClean="0"/>
-              <a:t>Other</a:t>
+              <a:t>1 VPC per Environment per Application</a:t>
+            </a:r>
+          </a:p>
+          <a:p>
+            <a:r>
+              <a:rPr lang="en-US" dirty="0" smtClean="0"/>
+              <a:t>And so on</a:t>
+            </a:r>
+            <a:r>
+              <a:rPr lang="is-IS" dirty="0" smtClean="0"/>
+              <a:t>….</a:t>
             </a:r>
             <a:endParaRPr lang="en-US" dirty="0" smtClean="0"/>
           </a:p>
@@ -18869,7 +18982,15 @@
           <a:p>
             <a:r>
               <a:rPr lang="en-US" dirty="0" smtClean="0"/>
-              <a:t>Isolating Resources is more Difficult</a:t>
+              <a:t>Isolating </a:t>
+            </a:r>
+            <a:r>
+              <a:rPr lang="en-US" dirty="0" smtClean="0"/>
+              <a:t>Management of Resources </a:t>
+            </a:r>
+            <a:r>
+              <a:rPr lang="en-US" dirty="0" smtClean="0"/>
+              <a:t>is more Difficult</a:t>
             </a:r>
             <a:endParaRPr lang="en-US" dirty="0"/>
           </a:p>
@@ -19282,7 +19403,7 @@
         <p:spPr/>
         <p:txBody>
           <a:bodyPr>
-            <a:normAutofit/>
+            <a:normAutofit fontScale="92500" lnSpcReduction="20000"/>
           </a:bodyPr>
           <a:lstStyle/>
           <a:p>
@@ -19308,13 +19429,54 @@
           <a:p>
             <a:r>
               <a:rPr lang="en-US" dirty="0" smtClean="0"/>
-              <a:t>VPN to VPC</a:t>
-            </a:r>
-          </a:p>
-          <a:p>
-            <a:r>
-              <a:rPr lang="en-US" dirty="0" smtClean="0"/>
-              <a:t>VPC Peering</a:t>
+              <a:t>Site to Site VPN</a:t>
+            </a:r>
+          </a:p>
+          <a:p>
+            <a:r>
+              <a:rPr lang="en-US" dirty="0" smtClean="0"/>
+              <a:t>Client to Gateway</a:t>
+            </a:r>
+          </a:p>
+          <a:p>
+            <a:pPr lvl="1"/>
+            <a:r>
+              <a:rPr lang="en-US" dirty="0" err="1"/>
+              <a:t>s</a:t>
+            </a:r>
+            <a:r>
+              <a:rPr lang="en-US" dirty="0" err="1" smtClean="0"/>
+              <a:t>sh</a:t>
+            </a:r>
+            <a:r>
+              <a:rPr lang="en-US" dirty="0" smtClean="0"/>
+              <a:t> Server</a:t>
+            </a:r>
+          </a:p>
+          <a:p>
+            <a:pPr lvl="1"/>
+            <a:r>
+              <a:rPr lang="en-US" dirty="0" smtClean="0"/>
+              <a:t>RDP Server</a:t>
+            </a:r>
+            <a:endParaRPr lang="en-US" dirty="0" smtClean="0"/>
+          </a:p>
+          <a:p>
+            <a:pPr lvl="1"/>
+            <a:r>
+              <a:rPr lang="en-US" dirty="0" smtClean="0"/>
+              <a:t>VPN Server</a:t>
+            </a:r>
+            <a:endParaRPr lang="en-US" dirty="0" smtClean="0"/>
+          </a:p>
+          <a:p>
+            <a:r>
+              <a:rPr lang="en-US" dirty="0" smtClean="0"/>
+              <a:t>VPC </a:t>
+            </a:r>
+            <a:r>
+              <a:rPr lang="en-US" dirty="0" smtClean="0"/>
+              <a:t>Peering</a:t>
             </a:r>
           </a:p>
           <a:p>
@@ -19412,15 +19574,7 @@
           <a:p>
             <a:r>
               <a:rPr lang="en-US" dirty="0" smtClean="0"/>
-              <a:t>If instances have Private IP address, </a:t>
-            </a:r>
-            <a:r>
-              <a:rPr lang="en-US" dirty="0" smtClean="0"/>
-              <a:t>require use of </a:t>
-            </a:r>
-            <a:r>
-              <a:rPr lang="en-US" dirty="0" smtClean="0"/>
-              <a:t>a NAT server</a:t>
+              <a:t>If instances have Private IP address, require use of a NAT server</a:t>
             </a:r>
           </a:p>
         </p:txBody>
@@ -19746,41 +19900,70 @@
             </a:r>
             <a:r>
               <a:rPr lang="en-US" dirty="0" smtClean="0"/>
-              <a:t>uses the following:</a:t>
+              <a:t>requires</a:t>
+            </a:r>
+            <a:r>
+              <a:rPr lang="en-US" dirty="0" smtClean="0"/>
+              <a:t> </a:t>
+            </a:r>
+            <a:r>
+              <a:rPr lang="en-US" dirty="0" smtClean="0"/>
+              <a:t>the following:</a:t>
+            </a:r>
+          </a:p>
+          <a:p>
+            <a:pPr lvl="1"/>
+            <a:r>
+              <a:rPr lang="en-US" dirty="0" smtClean="0"/>
+              <a:t>A Customer Gateway (Customer Equipment)</a:t>
+            </a:r>
+          </a:p>
+          <a:p>
+            <a:pPr lvl="1"/>
+            <a:r>
+              <a:rPr lang="en-US" dirty="0" smtClean="0"/>
+              <a:t>A Virtual Private Gateway (AWS Equipment)</a:t>
+            </a:r>
+          </a:p>
+          <a:p>
+            <a:r>
+              <a:rPr lang="en-US" dirty="0" smtClean="0"/>
+              <a:t>Example use cases:</a:t>
+            </a:r>
+          </a:p>
+          <a:p>
+            <a:pPr lvl="1"/>
+            <a:r>
+              <a:rPr lang="en-US" dirty="0" smtClean="0"/>
+              <a:t>Connect </a:t>
+            </a:r>
+            <a:r>
+              <a:rPr lang="en-US" dirty="0" smtClean="0"/>
+              <a:t>a Data Center </a:t>
+            </a:r>
+            <a:r>
+              <a:rPr lang="en-US" dirty="0" smtClean="0"/>
+              <a:t>to a VPC</a:t>
+            </a:r>
+          </a:p>
+          <a:p>
+            <a:pPr lvl="1"/>
+            <a:r>
+              <a:rPr lang="en-US" dirty="0" smtClean="0"/>
+              <a:t>Connect an </a:t>
+            </a:r>
+            <a:r>
+              <a:rPr lang="en-US" dirty="0" smtClean="0"/>
+              <a:t>Office to a VPC</a:t>
+            </a:r>
+          </a:p>
+          <a:p>
+            <a:pPr lvl="1"/>
+            <a:r>
+              <a:rPr lang="en-US" dirty="0" smtClean="0"/>
+              <a:t>Connect a VPC to a VPC</a:t>
             </a:r>
             <a:endParaRPr lang="en-US" dirty="0" smtClean="0"/>
-          </a:p>
-          <a:p>
-            <a:pPr lvl="1"/>
-            <a:r>
-              <a:rPr lang="en-US" dirty="0" smtClean="0"/>
-              <a:t>A </a:t>
-            </a:r>
-            <a:r>
-              <a:rPr lang="en-US" dirty="0" smtClean="0"/>
-              <a:t>Customer </a:t>
-            </a:r>
-            <a:r>
-              <a:rPr lang="en-US" dirty="0" smtClean="0"/>
-              <a:t>Gateway (Customer Equipment)</a:t>
-            </a:r>
-          </a:p>
-          <a:p>
-            <a:pPr lvl="1"/>
-            <a:r>
-              <a:rPr lang="en-US" dirty="0" smtClean="0"/>
-              <a:t>A Virtual </a:t>
-            </a:r>
-            <a:r>
-              <a:rPr lang="en-US" dirty="0" smtClean="0"/>
-              <a:t>Private Gateway (AWS Equipment)</a:t>
-            </a:r>
-          </a:p>
-          <a:p>
-            <a:r>
-              <a:rPr lang="en-US" dirty="0" smtClean="0"/>
-              <a:t>Connect a Data Center or Office Location</a:t>
-            </a:r>
           </a:p>
         </p:txBody>
       </p:sp>
@@ -19877,14 +20060,45 @@
           <a:p>
             <a:r>
               <a:rPr lang="en-US" dirty="0" smtClean="0"/>
-              <a:t>Choice of IP addressing schemes: public or private</a:t>
-            </a:r>
-          </a:p>
-          <a:p>
-            <a:r>
-              <a:rPr lang="en-US" dirty="0" smtClean="0"/>
-              <a:t>Various Network Connectivity Options</a:t>
-            </a:r>
+              <a:t>Choice of IP addressing schemes: public or </a:t>
+            </a:r>
+            <a:r>
+              <a:rPr lang="en-US" dirty="0" smtClean="0"/>
+              <a:t>private</a:t>
+            </a:r>
+            <a:endParaRPr lang="en-US" dirty="0" smtClean="0"/>
+          </a:p>
+          <a:p>
+            <a:r>
+              <a:rPr lang="en-US" dirty="0" smtClean="0"/>
+              <a:t>Various Network Connectivity </a:t>
+            </a:r>
+            <a:r>
+              <a:rPr lang="en-US" dirty="0" smtClean="0"/>
+              <a:t>Options, examples:</a:t>
+            </a:r>
+          </a:p>
+          <a:p>
+            <a:pPr lvl="1"/>
+            <a:r>
+              <a:rPr lang="en-US" dirty="0" smtClean="0"/>
+              <a:t>Site to Site VPN</a:t>
+            </a:r>
+          </a:p>
+          <a:p>
+            <a:pPr lvl="1"/>
+            <a:r>
+              <a:rPr lang="en-US" dirty="0" smtClean="0"/>
+              <a:t>Internet Gateway</a:t>
+            </a:r>
+          </a:p>
+          <a:p>
+            <a:pPr lvl="1"/>
+            <a:r>
+              <a:rPr lang="en-US" dirty="0" smtClean="0"/>
+              <a:t>Etc.</a:t>
+            </a:r>
+            <a:endParaRPr lang="en-US" dirty="0" smtClean="0"/>
           </a:p>
         </p:txBody>
       </p:sp>
@@ -20488,7 +20702,7 @@
         <p:spPr/>
         <p:txBody>
           <a:bodyPr>
-            <a:normAutofit fontScale="92500" lnSpcReduction="10000"/>
+            <a:normAutofit fontScale="92500" lnSpcReduction="20000"/>
           </a:bodyPr>
           <a:lstStyle/>
           <a:p>
@@ -20504,22 +20718,33 @@
               <a:rPr lang="en-US" dirty="0" smtClean="0"/>
               <a:t> or RDP)</a:t>
             </a:r>
-            <a:endParaRPr lang="en-US" dirty="0" smtClean="0"/>
-          </a:p>
-          <a:p>
+          </a:p>
+          <a:p>
+            <a:r>
+              <a:rPr lang="en-US" dirty="0" smtClean="0"/>
+              <a:t>Connect to </a:t>
+            </a:r>
             <a:r>
               <a:rPr lang="en-US" dirty="0" err="1" smtClean="0"/>
               <a:t>ssh</a:t>
             </a:r>
             <a:r>
               <a:rPr lang="en-US" dirty="0" smtClean="0"/>
-              <a:t> Based Bastion Host</a:t>
-            </a:r>
-          </a:p>
-          <a:p>
-            <a:r>
-              <a:rPr lang="en-US" dirty="0" smtClean="0"/>
-              <a:t>VPN Based Bastion Host</a:t>
+              <a:t> </a:t>
+            </a:r>
+            <a:r>
+              <a:rPr lang="en-US" dirty="0" smtClean="0"/>
+              <a:t>Based Bastion Host</a:t>
+            </a:r>
+          </a:p>
+          <a:p>
+            <a:r>
+              <a:rPr lang="en-US" dirty="0" smtClean="0"/>
+              <a:t>Connect to VPN </a:t>
+            </a:r>
+            <a:r>
+              <a:rPr lang="en-US" dirty="0" smtClean="0"/>
+              <a:t>Based Bastion Host</a:t>
             </a:r>
           </a:p>
           <a:p>
@@ -20532,18 +20757,26 @@
             <a:pPr lvl="1"/>
             <a:r>
               <a:rPr lang="en-US" dirty="0" smtClean="0"/>
-              <a:t>Potentially Extends </a:t>
-            </a:r>
-            <a:r>
-              <a:rPr lang="en-US" dirty="0" smtClean="0"/>
-              <a:t>network attack space</a:t>
-            </a:r>
-          </a:p>
-          <a:p>
-            <a:r>
-              <a:rPr lang="en-US" dirty="0" smtClean="0"/>
-              <a:t>Hybrid Approach</a:t>
-            </a:r>
+              <a:t>Potentially Extends network attack space</a:t>
+            </a:r>
+          </a:p>
+          <a:p>
+            <a:r>
+              <a:rPr lang="en-US" dirty="0" smtClean="0"/>
+              <a:t>Hybrid </a:t>
+            </a:r>
+            <a:r>
+              <a:rPr lang="en-US" dirty="0" smtClean="0"/>
+              <a:t>Approach</a:t>
+            </a:r>
+          </a:p>
+          <a:p>
+            <a:pPr lvl="1"/>
+            <a:r>
+              <a:rPr lang="en-US" dirty="0" smtClean="0"/>
+              <a:t>Site to Site VPN with a Bastion Host</a:t>
+            </a:r>
+            <a:endParaRPr lang="en-US" dirty="0" smtClean="0"/>
           </a:p>
           <a:p>
             <a:r>
@@ -20552,11 +20785,7 @@
             </a:r>
             <a:r>
               <a:rPr lang="en-US" i="1" dirty="0" smtClean="0"/>
-              <a:t>my experience is companies simply choose the technology they are most familiar with and then switch if needed</a:t>
-            </a:r>
-            <a:r>
-              <a:rPr lang="en-US" i="1" dirty="0" smtClean="0"/>
-              <a:t>.</a:t>
+              <a:t>my experience is companies simply choose the technology they are most familiar with and then switch if needed.</a:t>
             </a:r>
             <a:endParaRPr lang="en-US" i="1" dirty="0"/>
           </a:p>
@@ -20581,7 +20810,11 @@
           <a:p>
             <a:r>
               <a:rPr lang="en-US" dirty="0" smtClean="0"/>
-              <a:t>VPC: Client Ingress Options</a:t>
+              <a:t>VPC: Client </a:t>
+            </a:r>
+            <a:r>
+              <a:rPr lang="en-US" dirty="0" smtClean="0"/>
+              <a:t>Connectivity Options</a:t>
             </a:r>
             <a:endParaRPr lang="en-US" dirty="0"/>
           </a:p>
@@ -20637,7 +20870,7 @@
         <p:spPr/>
         <p:txBody>
           <a:bodyPr>
-            <a:normAutofit/>
+            <a:normAutofit fontScale="92500" lnSpcReduction="10000"/>
           </a:bodyPr>
           <a:lstStyle/>
           <a:p>
@@ -20719,8 +20952,27 @@
             </a:r>
             <a:r>
               <a:rPr lang="en-US" dirty="0" smtClean="0"/>
-              <a:t>/RDP combination may be difficult</a:t>
-            </a:r>
+              <a:t>/RDP combination may be </a:t>
+            </a:r>
+            <a:r>
+              <a:rPr lang="en-US" dirty="0" smtClean="0"/>
+              <a:t>difficult</a:t>
+            </a:r>
+          </a:p>
+          <a:p>
+            <a:r>
+              <a:rPr lang="en-US" dirty="0" err="1"/>
+              <a:t>s</a:t>
+            </a:r>
+            <a:r>
+              <a:rPr lang="en-US" dirty="0" err="1" smtClean="0"/>
+              <a:t>sh</a:t>
+            </a:r>
+            <a:r>
+              <a:rPr lang="en-US" dirty="0" smtClean="0"/>
+              <a:t> Bastion host may be a single point of failure</a:t>
+            </a:r>
+            <a:endParaRPr lang="en-US" dirty="0" smtClean="0"/>
           </a:p>
           <a:p>
             <a:endParaRPr lang="en-US" dirty="0" smtClean="0"/>
@@ -20746,7 +20998,15 @@
           <a:p>
             <a:r>
               <a:rPr lang="en-US" dirty="0" smtClean="0"/>
-              <a:t>VPC Client Ingress: </a:t>
+              <a:t>VPC Client </a:t>
+            </a:r>
+            <a:r>
+              <a:rPr lang="en-US" dirty="0" err="1" smtClean="0"/>
+              <a:t>Connectity</a:t>
+            </a:r>
+            <a:r>
+              <a:rPr lang="en-US" dirty="0" smtClean="0"/>
+              <a:t>: </a:t>
             </a:r>
             <a:r>
               <a:rPr lang="en-US" dirty="0" err="1" smtClean="0"/>
@@ -20914,11 +21174,7 @@
           <a:p>
             <a:r>
               <a:rPr lang="en-US" dirty="0" smtClean="0"/>
-              <a:t>VPN </a:t>
-            </a:r>
-            <a:r>
-              <a:rPr lang="en-US" dirty="0" smtClean="0"/>
-              <a:t>use generally straight-forward and familiar</a:t>
+              <a:t>VPN use generally straight-forward and familiar</a:t>
             </a:r>
           </a:p>
           <a:p>
@@ -20929,6 +21185,12 @@
             <a:r>
               <a:rPr lang="en-US" dirty="0" smtClean="0"/>
               <a:t>organizations</a:t>
+            </a:r>
+          </a:p>
+          <a:p>
+            <a:r>
+              <a:rPr lang="en-US" dirty="0" smtClean="0"/>
+              <a:t>VPN endpoint may be a single point of failure</a:t>
             </a:r>
             <a:endParaRPr lang="en-US" dirty="0" smtClean="0"/>
           </a:p>
@@ -20953,7 +21215,19 @@
           <a:p>
             <a:r>
               <a:rPr lang="en-US" dirty="0" smtClean="0"/>
-              <a:t>VPC Client Ingress: VPN Host</a:t>
+              <a:t>VPC Client </a:t>
+            </a:r>
+            <a:r>
+              <a:rPr lang="en-US" dirty="0" smtClean="0"/>
+              <a:t>Connectivity</a:t>
+            </a:r>
+            <a:r>
+              <a:rPr lang="en-US" dirty="0" smtClean="0"/>
+              <a:t>: </a:t>
+            </a:r>
+            <a:r>
+              <a:rPr lang="en-US" dirty="0" smtClean="0"/>
+              <a:t>VPN Host</a:t>
             </a:r>
             <a:endParaRPr lang="en-US" dirty="0"/>
           </a:p>
@@ -21163,19 +21437,38 @@
         </p:nvSpPr>
         <p:spPr/>
         <p:txBody>
-          <a:bodyPr/>
+          <a:bodyPr>
+            <a:normAutofit/>
+          </a:bodyPr>
           <a:lstStyle/>
           <a:p>
             <a:r>
               <a:rPr lang="en-US" dirty="0" smtClean="0"/>
-              <a:t>Management of NAT servers</a:t>
-            </a:r>
-          </a:p>
-          <a:p>
-            <a:r>
-              <a:rPr lang="en-US" dirty="0" smtClean="0"/>
               <a:t>Increased complexity</a:t>
             </a:r>
+          </a:p>
+          <a:p>
+            <a:pPr lvl="1"/>
+            <a:r>
+              <a:rPr lang="en-US" dirty="0" smtClean="0"/>
+              <a:t>Possible </a:t>
+            </a:r>
+            <a:r>
+              <a:rPr lang="en-US" dirty="0"/>
+              <a:t>management of NAT </a:t>
+            </a:r>
+            <a:r>
+              <a:rPr lang="en-US" dirty="0" smtClean="0"/>
+              <a:t>servers</a:t>
+            </a:r>
+          </a:p>
+          <a:p>
+            <a:pPr lvl="1"/>
+            <a:r>
+              <a:rPr lang="en-US" dirty="0" smtClean="0"/>
+              <a:t>Additional Resources such as Internet Gateways</a:t>
+            </a:r>
+            <a:endParaRPr lang="en-US" dirty="0" smtClean="0"/>
           </a:p>
           <a:p>
             <a:r>
@@ -21236,7 +21529,7 @@
         <p:spPr/>
         <p:txBody>
           <a:bodyPr>
-            <a:normAutofit/>
+            <a:normAutofit lnSpcReduction="10000"/>
           </a:bodyPr>
           <a:lstStyle/>
           <a:p>
@@ -21248,7 +21541,11 @@
           <a:p>
             <a:r>
               <a:rPr lang="en-US" dirty="0" smtClean="0"/>
-              <a:t>On-site network security</a:t>
+              <a:t>On-premise network </a:t>
+            </a:r>
+            <a:r>
+              <a:rPr lang="en-US" dirty="0" smtClean="0"/>
+              <a:t>security</a:t>
             </a:r>
             <a:r>
               <a:rPr lang="en-US" dirty="0"/>
@@ -21256,17 +21553,37 @@
             </a:r>
             <a:r>
               <a:rPr lang="en-US" dirty="0" smtClean="0"/>
-              <a:t>must meet standards required by company</a:t>
-            </a:r>
-          </a:p>
-          <a:p>
-            <a:r>
-              <a:rPr lang="en-US" dirty="0" smtClean="0"/>
-              <a:t>If off-site, clients </a:t>
-            </a:r>
-            <a:r>
-              <a:rPr lang="en-US" dirty="0" smtClean="0"/>
-              <a:t>will not be able to utilize Site to Site VPN:</a:t>
+              <a:t>should meet security standards </a:t>
+            </a:r>
+            <a:r>
+              <a:rPr lang="en-US" dirty="0" smtClean="0"/>
+              <a:t>required by </a:t>
+            </a:r>
+            <a:r>
+              <a:rPr lang="en-US" dirty="0" smtClean="0"/>
+              <a:t>company</a:t>
+            </a:r>
+          </a:p>
+          <a:p>
+            <a:pPr lvl="1"/>
+            <a:r>
+              <a:rPr lang="en-US" dirty="0" smtClean="0"/>
+              <a:t>Example: if on-site network is open and on-site network is allowed to access VPC</a:t>
+            </a:r>
+            <a:endParaRPr lang="en-US" dirty="0" smtClean="0"/>
+          </a:p>
+          <a:p>
+            <a:r>
+              <a:rPr lang="en-US" dirty="0" smtClean="0"/>
+              <a:t>If </a:t>
+            </a:r>
+            <a:r>
+              <a:rPr lang="en-US" dirty="0" smtClean="0"/>
+              <a:t>off-site, </a:t>
+            </a:r>
+            <a:r>
+              <a:rPr lang="en-US" dirty="0" smtClean="0"/>
+              <a:t>clients will not be able to utilize Site to Site VPN:</a:t>
             </a:r>
           </a:p>
           <a:p>
@@ -21281,8 +21598,15 @@
             </a:r>
             <a:r>
               <a:rPr lang="en-US" dirty="0" smtClean="0"/>
-              <a:t> to VPC</a:t>
-            </a:r>
+              <a:t> to </a:t>
+            </a:r>
+            <a:r>
+              <a:rPr lang="en-US" dirty="0" smtClean="0"/>
+              <a:t>VPC or VPN into on-site network</a:t>
+            </a:r>
+          </a:p>
+          <a:p>
+            <a:pPr lvl="1"/>
             <a:endParaRPr lang="en-US" dirty="0" smtClean="0"/>
           </a:p>
         </p:txBody>
@@ -21306,7 +21630,15 @@
           <a:p>
             <a:r>
               <a:rPr lang="en-US" dirty="0" smtClean="0"/>
-              <a:t>VPC Client Ingress: Site to Site VPN</a:t>
+              <a:t>VPC Client </a:t>
+            </a:r>
+            <a:r>
+              <a:rPr lang="en-US" dirty="0" smtClean="0"/>
+              <a:t>Connectivity: </a:t>
+            </a:r>
+            <a:r>
+              <a:rPr lang="en-US" dirty="0" smtClean="0"/>
+              <a:t>Site to Site VPN</a:t>
             </a:r>
             <a:endParaRPr lang="en-US" dirty="0"/>
           </a:p>
@@ -21452,7 +21784,7 @@
         <p:spPr/>
         <p:txBody>
           <a:bodyPr>
-            <a:normAutofit/>
+            <a:normAutofit lnSpcReduction="10000"/>
           </a:bodyPr>
           <a:lstStyle/>
           <a:p>
@@ -21496,11 +21828,7 @@
           <a:p>
             <a:r>
               <a:rPr lang="en-US" dirty="0" smtClean="0"/>
-              <a:t>Company with non-technical users of AWS resources, all in one office and comfortable with </a:t>
-            </a:r>
-            <a:r>
-              <a:rPr lang="en-US" dirty="0" smtClean="0"/>
-              <a:t>existing </a:t>
+              <a:t>Company with non-technical users of AWS resources, all in one office and comfortable with existing </a:t>
             </a:r>
             <a:r>
               <a:rPr lang="en-US" dirty="0" err="1" smtClean="0"/>
@@ -21512,8 +21840,25 @@
             </a:r>
             <a:r>
               <a:rPr lang="en-US" dirty="0" smtClean="0"/>
-              <a:t>security: Site to Site VPN + VPN</a:t>
-            </a:r>
+              <a:t>network security</a:t>
+            </a:r>
+            <a:r>
+              <a:rPr lang="en-US" dirty="0" smtClean="0"/>
+              <a:t>: Site to Site VPN + </a:t>
+            </a:r>
+            <a:r>
+              <a:rPr lang="en-US" dirty="0" smtClean="0"/>
+              <a:t>off-</a:t>
+            </a:r>
+            <a:r>
+              <a:rPr lang="en-US" dirty="0" smtClean="0"/>
+              <a:t>premise </a:t>
+            </a:r>
+            <a:r>
+              <a:rPr lang="en-US" dirty="0" smtClean="0"/>
+              <a:t>VPN</a:t>
+            </a:r>
+            <a:endParaRPr lang="en-US" dirty="0" smtClean="0"/>
           </a:p>
         </p:txBody>
       </p:sp>
@@ -21530,13 +21875,21 @@
         <p:spPr/>
         <p:txBody>
           <a:bodyPr>
-            <a:normAutofit/>
+            <a:normAutofit fontScale="90000"/>
           </a:bodyPr>
           <a:lstStyle/>
           <a:p>
             <a:r>
               <a:rPr lang="en-US" dirty="0" smtClean="0"/>
-              <a:t>VPC Client Ingress: Suggestions</a:t>
+              <a:t>VPC Client </a:t>
+            </a:r>
+            <a:r>
+              <a:rPr lang="en-US" dirty="0" smtClean="0"/>
+              <a:t>Connectivity: </a:t>
+            </a:r>
+            <a:r>
+              <a:rPr lang="en-US" dirty="0" smtClean="0"/>
+              <a:t>Suggestions</a:t>
             </a:r>
             <a:endParaRPr lang="en-US" dirty="0"/>
           </a:p>
@@ -21644,8 +21997,12 @@
           <a:lstStyle/>
           <a:p>
             <a:r>
-              <a:rPr lang="en-US" dirty="0" smtClean="0"/>
-              <a:t>Hands On: Create a VPC</a:t>
+              <a:rPr lang="en-US" smtClean="0"/>
+              <a:t>Lab: </a:t>
+            </a:r>
+            <a:r>
+              <a:rPr lang="en-US" dirty="0" smtClean="0"/>
+              <a:t>Create a VPC</a:t>
             </a:r>
             <a:endParaRPr lang="en-US" dirty="0"/>
           </a:p>
@@ -21851,8 +22208,13 @@
           <a:p>
             <a:r>
               <a:rPr lang="en-US" dirty="0" smtClean="0"/>
-              <a:t>Always includes VPC CIDR Range</a:t>
-            </a:r>
+              <a:t>Always includes VPC CIDR </a:t>
+            </a:r>
+            <a:r>
+              <a:rPr lang="en-US" dirty="0" smtClean="0"/>
+              <a:t>Range</a:t>
+            </a:r>
+            <a:endParaRPr lang="en-US" dirty="0" smtClean="0"/>
           </a:p>
           <a:p>
             <a:r>

</xml_diff>